<commit_message>
Modification : Risques de la présentation + Typo
</commit_message>
<xml_diff>
--- a/P9_Presentation_PowerPoint.pptx
+++ b/P9_Presentation_PowerPoint.pptx
@@ -11,10 +11,10 @@
     <p:sldId id="256" r:id="rId2"/>
     <p:sldId id="277" r:id="rId3"/>
     <p:sldId id="284" r:id="rId4"/>
-    <p:sldId id="283" r:id="rId5"/>
-    <p:sldId id="287" r:id="rId6"/>
-    <p:sldId id="285" r:id="rId7"/>
-    <p:sldId id="286" r:id="rId8"/>
+    <p:sldId id="287" r:id="rId5"/>
+    <p:sldId id="285" r:id="rId6"/>
+    <p:sldId id="286" r:id="rId7"/>
+    <p:sldId id="283" r:id="rId8"/>
     <p:sldId id="282" r:id="rId9"/>
   </p:sldIdLst>
   <p:sldSz cx="12192000" cy="6858000"/>
@@ -269,7 +269,7 @@
       <p15:sldGuideLst xmlns:p15="http://schemas.microsoft.com/office/powerpoint/2012/main"/>
     </p:ext>
     <p:ext uri="http://customooxmlschemas.google.com/">
-      <go:slidesCustomData xmlns="" xmlns:mc="http://schemas.openxmlformats.org/markup-compatibility/2006" xmlns:mv="urn:schemas-microsoft-com:mac:vml" xmlns:c="http://schemas.openxmlformats.org/drawingml/2006/chart" xmlns:dgm="http://schemas.openxmlformats.org/drawingml/2006/diagram" xmlns:o="urn:schemas-microsoft-com:office:office" xmlns:v="urn:schemas-microsoft-com:vml" xmlns:pvml="urn:schemas-microsoft-com:office:powerpoint" xmlns:com="http://schemas.openxmlformats.org/drawingml/2006/compatibility" xmlns:p14="http://schemas.microsoft.com/office/powerpoint/2010/main" xmlns:p15="http://schemas.microsoft.com/office/powerpoint/2012/main" xmlns:ahyp="http://schemas.microsoft.com/office/drawing/2018/hyperlinkcolor" xmlns:go="http://customooxmlschemas.google.com/" r:id="rId27" roundtripDataSignature="AMtx7mj9v4mVwuk3R2EILRXVavI/T1yyYg=="/>
+      <go:slidesCustomData xmlns:go="http://customooxmlschemas.google.com/" xmlns:ahyp="http://schemas.microsoft.com/office/drawing/2018/hyperlinkcolor" xmlns:p15="http://schemas.microsoft.com/office/powerpoint/2012/main" xmlns:p14="http://schemas.microsoft.com/office/powerpoint/2010/main" xmlns:com="http://schemas.openxmlformats.org/drawingml/2006/compatibility" xmlns:pvml="urn:schemas-microsoft-com:office:powerpoint" xmlns:v="urn:schemas-microsoft-com:vml" xmlns:o="urn:schemas-microsoft-com:office:office" xmlns:dgm="http://schemas.openxmlformats.org/drawingml/2006/diagram" xmlns:c="http://schemas.openxmlformats.org/drawingml/2006/chart" xmlns:mv="urn:schemas-microsoft-com:mac:vml" xmlns:mc="http://schemas.openxmlformats.org/markup-compatibility/2006" xmlns="" r:id="rId27" roundtripDataSignature="AMtx7mj9v4mVwuk3R2EILRXVavI/T1yyYg=="/>
     </p:ext>
   </p:extLst>
 </p:presentation>
@@ -1173,7 +1173,7 @@
     </p:spTree>
     <p:extLst>
       <p:ext uri="{BB962C8B-B14F-4D97-AF65-F5344CB8AC3E}">
-        <p14:creationId xmlns:p14="http://schemas.microsoft.com/office/powerpoint/2010/main" val="1844213305"/>
+        <p14:creationId xmlns:p14="http://schemas.microsoft.com/office/powerpoint/2010/main" val="993012387"/>
       </p:ext>
     </p:extLst>
   </p:cSld>
@@ -1242,7 +1242,7 @@
     </p:spTree>
     <p:extLst>
       <p:ext uri="{BB962C8B-B14F-4D97-AF65-F5344CB8AC3E}">
-        <p14:creationId xmlns:p14="http://schemas.microsoft.com/office/powerpoint/2010/main" val="993012387"/>
+        <p14:creationId xmlns:p14="http://schemas.microsoft.com/office/powerpoint/2010/main" val="1076153856"/>
       </p:ext>
     </p:extLst>
   </p:cSld>
@@ -1311,7 +1311,7 @@
     </p:spTree>
     <p:extLst>
       <p:ext uri="{BB962C8B-B14F-4D97-AF65-F5344CB8AC3E}">
-        <p14:creationId xmlns:p14="http://schemas.microsoft.com/office/powerpoint/2010/main" val="1076153856"/>
+        <p14:creationId xmlns:p14="http://schemas.microsoft.com/office/powerpoint/2010/main" val="1986377803"/>
       </p:ext>
     </p:extLst>
   </p:cSld>
@@ -1380,7 +1380,7 @@
     </p:spTree>
     <p:extLst>
       <p:ext uri="{BB962C8B-B14F-4D97-AF65-F5344CB8AC3E}">
-        <p14:creationId xmlns:p14="http://schemas.microsoft.com/office/powerpoint/2010/main" val="1986377803"/>
+        <p14:creationId xmlns:p14="http://schemas.microsoft.com/office/powerpoint/2010/main" val="1844213305"/>
       </p:ext>
     </p:extLst>
   </p:cSld>
@@ -15302,6 +15302,13 @@
               <a:rPr lang="fr-FR" sz="2400" dirty="0"/>
               <a:t>- Affecter les lots de travaux</a:t>
             </a:r>
+            <a:br>
+              <a:rPr lang="fr-FR" sz="2400" dirty="0"/>
+            </a:br>
+            <a:r>
+              <a:rPr lang="fr-FR" sz="2400" dirty="0"/>
+              <a:t>- Définir les KPIs Business avec le client</a:t>
+            </a:r>
           </a:p>
         </p:txBody>
       </p:sp>
@@ -15319,369 +15326,6 @@
 </file>
 
 <file path=ppt/slides/slide4.xml><?xml version="1.0" encoding="utf-8"?>
-<p:sld xmlns:a="http://schemas.openxmlformats.org/drawingml/2006/main" xmlns:r="http://schemas.openxmlformats.org/officeDocument/2006/relationships" xmlns:p="http://schemas.openxmlformats.org/presentationml/2006/main">
-  <p:cSld>
-    <p:spTree>
-      <p:nvGrpSpPr>
-        <p:cNvPr id="1" name=""/>
-        <p:cNvGrpSpPr/>
-        <p:nvPr/>
-      </p:nvGrpSpPr>
-      <p:grpSpPr>
-        <a:xfrm>
-          <a:off x="0" y="0"/>
-          <a:ext cx="0" cy="0"/>
-          <a:chOff x="0" y="0"/>
-          <a:chExt cx="0" cy="0"/>
-        </a:xfrm>
-      </p:grpSpPr>
-      <p:grpSp>
-        <p:nvGrpSpPr>
-          <p:cNvPr id="8" name="Google Shape;84;p1">
-            <a:extLst>
-              <a:ext uri="{FF2B5EF4-FFF2-40B4-BE49-F238E27FC236}">
-                <a16:creationId xmlns:a16="http://schemas.microsoft.com/office/drawing/2014/main" id="{B1C64784-E3AE-A466-2118-F93376B6D0FB}"/>
-              </a:ext>
-            </a:extLst>
-          </p:cNvPr>
-          <p:cNvGrpSpPr/>
-          <p:nvPr/>
-        </p:nvGrpSpPr>
-        <p:grpSpPr>
-          <a:xfrm>
-            <a:off x="0" y="-817728"/>
-            <a:ext cx="12195742" cy="2214463"/>
-            <a:chOff x="0" y="-11638"/>
-            <a:chExt cx="7315200" cy="1216152"/>
-          </a:xfrm>
-        </p:grpSpPr>
-        <p:sp>
-          <p:nvSpPr>
-            <p:cNvPr id="10" name="Google Shape;85;p1">
-              <a:extLst>
-                <a:ext uri="{FF2B5EF4-FFF2-40B4-BE49-F238E27FC236}">
-                  <a16:creationId xmlns:a16="http://schemas.microsoft.com/office/drawing/2014/main" id="{586C0C77-84A2-19C8-7E33-54F151175A5D}"/>
-                </a:ext>
-              </a:extLst>
-            </p:cNvPr>
-            <p:cNvSpPr/>
-            <p:nvPr/>
-          </p:nvSpPr>
-          <p:spPr>
-            <a:xfrm>
-              <a:off x="0" y="-1"/>
-              <a:ext cx="7315200" cy="1130373"/>
-            </a:xfrm>
-            <a:custGeom>
-              <a:avLst/>
-              <a:gdLst/>
-              <a:ahLst/>
-              <a:cxnLst/>
-              <a:rect l="l" t="t" r="r" b="b"/>
-              <a:pathLst>
-                <a:path w="7312660" h="1129665" extrusionOk="0">
-                  <a:moveTo>
-                    <a:pt x="0" y="0"/>
-                  </a:moveTo>
-                  <a:lnTo>
-                    <a:pt x="7312660" y="0"/>
-                  </a:lnTo>
-                  <a:lnTo>
-                    <a:pt x="7312660" y="1129665"/>
-                  </a:lnTo>
-                  <a:lnTo>
-                    <a:pt x="3619500" y="733425"/>
-                  </a:lnTo>
-                  <a:lnTo>
-                    <a:pt x="0" y="1091565"/>
-                  </a:lnTo>
-                  <a:lnTo>
-                    <a:pt x="0" y="0"/>
-                  </a:lnTo>
-                  <a:close/>
-                </a:path>
-              </a:pathLst>
-            </a:custGeom>
-            <a:solidFill>
-              <a:srgbClr val="2D7287"/>
-            </a:solidFill>
-            <a:ln>
-              <a:noFill/>
-            </a:ln>
-          </p:spPr>
-          <p:txBody>
-            <a:bodyPr spcFirstLastPara="1" wrap="square" lIns="91425" tIns="45700" rIns="91425" bIns="45700" anchor="ctr" anchorCtr="0">
-              <a:noAutofit/>
-            </a:bodyPr>
-            <a:lstStyle/>
-            <a:p>
-              <a:pPr marL="0" marR="0" lvl="0" indent="0" algn="l" rtl="0">
-                <a:lnSpc>
-                  <a:spcPct val="100000"/>
-                </a:lnSpc>
-                <a:spcBef>
-                  <a:spcPts val="0"/>
-                </a:spcBef>
-                <a:spcAft>
-                  <a:spcPts val="0"/>
-                </a:spcAft>
-                <a:buClr>
-                  <a:srgbClr val="000000"/>
-                </a:buClr>
-                <a:buSzPts val="1800"/>
-                <a:buFont typeface="Arial"/>
-                <a:buNone/>
-              </a:pPr>
-              <a:endParaRPr sz="1800" b="0" i="0" u="none" strike="noStrike" cap="none">
-                <a:solidFill>
-                  <a:schemeClr val="lt1"/>
-                </a:solidFill>
-                <a:latin typeface="Open Sans" panose="020B0606030504020204" pitchFamily="34" charset="0"/>
-                <a:ea typeface="Open Sans" panose="020B0606030504020204" pitchFamily="34" charset="0"/>
-                <a:cs typeface="Open Sans" panose="020B0606030504020204" pitchFamily="34" charset="0"/>
-                <a:sym typeface="Calibri"/>
-              </a:endParaRPr>
-            </a:p>
-          </p:txBody>
-        </p:sp>
-        <p:sp>
-          <p:nvSpPr>
-            <p:cNvPr id="11" name="Google Shape;86;p1">
-              <a:extLst>
-                <a:ext uri="{FF2B5EF4-FFF2-40B4-BE49-F238E27FC236}">
-                  <a16:creationId xmlns:a16="http://schemas.microsoft.com/office/drawing/2014/main" id="{45B2ADFE-3339-987E-2297-422E44A83E6E}"/>
-                </a:ext>
-              </a:extLst>
-            </p:cNvPr>
-            <p:cNvSpPr/>
-            <p:nvPr/>
-          </p:nvSpPr>
-          <p:spPr>
-            <a:xfrm>
-              <a:off x="0" y="-11638"/>
-              <a:ext cx="7315200" cy="1216152"/>
-            </a:xfrm>
-            <a:prstGeom prst="rect">
-              <a:avLst/>
-            </a:prstGeom>
-            <a:blipFill rotWithShape="1">
-              <a:blip r:embed="rId3">
-                <a:alphaModFix/>
-              </a:blip>
-              <a:stretch>
-                <a:fillRect r="-7571"/>
-              </a:stretch>
-            </a:blipFill>
-            <a:ln>
-              <a:noFill/>
-            </a:ln>
-          </p:spPr>
-          <p:txBody>
-            <a:bodyPr spcFirstLastPara="1" wrap="square" lIns="91425" tIns="45700" rIns="91425" bIns="45700" anchor="ctr" anchorCtr="0">
-              <a:noAutofit/>
-            </a:bodyPr>
-            <a:lstStyle/>
-            <a:p>
-              <a:pPr marL="0" marR="0" lvl="0" indent="0" algn="l" rtl="0">
-                <a:lnSpc>
-                  <a:spcPct val="100000"/>
-                </a:lnSpc>
-                <a:spcBef>
-                  <a:spcPts val="0"/>
-                </a:spcBef>
-                <a:spcAft>
-                  <a:spcPts val="0"/>
-                </a:spcAft>
-                <a:buClr>
-                  <a:srgbClr val="000000"/>
-                </a:buClr>
-                <a:buSzPts val="1800"/>
-                <a:buFont typeface="Arial"/>
-                <a:buNone/>
-              </a:pPr>
-              <a:endParaRPr sz="1800" b="0" i="0" u="none" strike="noStrike" cap="none">
-                <a:solidFill>
-                  <a:schemeClr val="lt1"/>
-                </a:solidFill>
-                <a:latin typeface="Open Sans" panose="020B0606030504020204" pitchFamily="34" charset="0"/>
-                <a:ea typeface="Open Sans" panose="020B0606030504020204" pitchFamily="34" charset="0"/>
-                <a:cs typeface="Open Sans" panose="020B0606030504020204" pitchFamily="34" charset="0"/>
-                <a:sym typeface="Calibri"/>
-              </a:endParaRPr>
-            </a:p>
-          </p:txBody>
-        </p:sp>
-      </p:grpSp>
-      <p:sp>
-        <p:nvSpPr>
-          <p:cNvPr id="13" name="ZoneTexte 12">
-            <a:extLst>
-              <a:ext uri="{FF2B5EF4-FFF2-40B4-BE49-F238E27FC236}">
-                <a16:creationId xmlns:a16="http://schemas.microsoft.com/office/drawing/2014/main" id="{F0D2CC9A-5ABC-4149-B06D-5FE38628CBDC}"/>
-              </a:ext>
-            </a:extLst>
-          </p:cNvPr>
-          <p:cNvSpPr txBox="1"/>
-          <p:nvPr/>
-        </p:nvSpPr>
-        <p:spPr>
-          <a:xfrm>
-            <a:off x="290457" y="698147"/>
-            <a:ext cx="11056994" cy="584775"/>
-          </a:xfrm>
-          <a:prstGeom prst="rect">
-            <a:avLst/>
-          </a:prstGeom>
-          <a:noFill/>
-        </p:spPr>
-        <p:txBody>
-          <a:bodyPr wrap="square">
-            <a:spAutoFit/>
-          </a:bodyPr>
-          <a:lstStyle/>
-          <a:p>
-            <a:pPr algn="ctr"/>
-            <a:r>
-              <a:rPr kumimoji="0" lang="fr-FR" sz="3200" b="1" i="0" u="none" strike="noStrike" kern="0" cap="none" spc="0" normalizeH="0" baseline="0" noProof="0" dirty="0">
-                <a:ln>
-                  <a:noFill/>
-                </a:ln>
-                <a:solidFill>
-                  <a:schemeClr val="tx1"/>
-                </a:solidFill>
-                <a:effectLst/>
-                <a:uLnTx/>
-                <a:uFillTx/>
-                <a:latin typeface="Open Sans" panose="020B0606030504020204" pitchFamily="34" charset="0"/>
-                <a:ea typeface="Open Sans" panose="020B0606030504020204" pitchFamily="34" charset="0"/>
-                <a:cs typeface="Open Sans" panose="020B0606030504020204" pitchFamily="34" charset="0"/>
-                <a:sym typeface="Open Sans"/>
-              </a:rPr>
-              <a:t>RISQUES IDENTIFIÉS</a:t>
-            </a:r>
-            <a:endParaRPr lang="fr-FR" dirty="0">
-              <a:solidFill>
-                <a:schemeClr val="tx1"/>
-              </a:solidFill>
-            </a:endParaRPr>
-          </a:p>
-        </p:txBody>
-      </p:sp>
-      <p:pic>
-        <p:nvPicPr>
-          <p:cNvPr id="6" name="Image 5">
-            <a:extLst>
-              <a:ext uri="{FF2B5EF4-FFF2-40B4-BE49-F238E27FC236}">
-                <a16:creationId xmlns:a16="http://schemas.microsoft.com/office/drawing/2014/main" id="{37F3FD66-3A51-F225-FDE2-DBD76A35D1D3}"/>
-              </a:ext>
-            </a:extLst>
-          </p:cNvPr>
-          <p:cNvPicPr>
-            <a:picLocks noChangeAspect="1"/>
-          </p:cNvPicPr>
-          <p:nvPr/>
-        </p:nvPicPr>
-        <p:blipFill>
-          <a:blip r:embed="rId4"/>
-          <a:stretch>
-            <a:fillRect/>
-          </a:stretch>
-        </p:blipFill>
-        <p:spPr>
-          <a:xfrm>
-            <a:off x="101380" y="1282922"/>
-            <a:ext cx="5610931" cy="5245568"/>
-          </a:xfrm>
-          <a:prstGeom prst="rect">
-            <a:avLst/>
-          </a:prstGeom>
-        </p:spPr>
-      </p:pic>
-      <p:pic>
-        <p:nvPicPr>
-          <p:cNvPr id="9" name="Image 8">
-            <a:extLst>
-              <a:ext uri="{FF2B5EF4-FFF2-40B4-BE49-F238E27FC236}">
-                <a16:creationId xmlns:a16="http://schemas.microsoft.com/office/drawing/2014/main" id="{102ECF47-96B9-E945-5D8A-D4364898DE94}"/>
-              </a:ext>
-            </a:extLst>
-          </p:cNvPr>
-          <p:cNvPicPr>
-            <a:picLocks noChangeAspect="1"/>
-          </p:cNvPicPr>
-          <p:nvPr/>
-        </p:nvPicPr>
-        <p:blipFill>
-          <a:blip r:embed="rId5"/>
-          <a:stretch>
-            <a:fillRect/>
-          </a:stretch>
-        </p:blipFill>
-        <p:spPr>
-          <a:xfrm>
-            <a:off x="5818954" y="1324654"/>
-            <a:ext cx="6373046" cy="5319507"/>
-          </a:xfrm>
-          <a:prstGeom prst="rect">
-            <a:avLst/>
-          </a:prstGeom>
-        </p:spPr>
-      </p:pic>
-      <p:pic>
-        <p:nvPicPr>
-          <p:cNvPr id="15" name="Image 14">
-            <a:extLst>
-              <a:ext uri="{FF2B5EF4-FFF2-40B4-BE49-F238E27FC236}">
-                <a16:creationId xmlns:a16="http://schemas.microsoft.com/office/drawing/2014/main" id="{CD1169C9-2E70-0C8B-D7F5-102755A884A5}"/>
-              </a:ext>
-            </a:extLst>
-          </p:cNvPr>
-          <p:cNvPicPr>
-            <a:picLocks noChangeAspect="1"/>
-          </p:cNvPicPr>
-          <p:nvPr/>
-        </p:nvPicPr>
-        <p:blipFill>
-          <a:blip r:embed="rId6">
-            <a:extLst>
-              <a:ext uri="{28A0092B-C50C-407E-A947-70E740481C1C}">
-                <a14:useLocalDpi xmlns:a14="http://schemas.microsoft.com/office/drawing/2010/main" val="0"/>
-              </a:ext>
-            </a:extLst>
-          </a:blip>
-          <a:srcRect/>
-          <a:stretch>
-            <a:fillRect/>
-          </a:stretch>
-        </p:blipFill>
-        <p:spPr bwMode="auto">
-          <a:xfrm>
-            <a:off x="139850" y="5902292"/>
-            <a:ext cx="869322" cy="869322"/>
-          </a:xfrm>
-          <a:prstGeom prst="rect">
-            <a:avLst/>
-          </a:prstGeom>
-          <a:noFill/>
-          <a:ln>
-            <a:noFill/>
-          </a:ln>
-        </p:spPr>
-      </p:pic>
-    </p:spTree>
-    <p:extLst>
-      <p:ext uri="{BB962C8B-B14F-4D97-AF65-F5344CB8AC3E}">
-        <p14:creationId xmlns:p14="http://schemas.microsoft.com/office/powerpoint/2010/main" val="1502992412"/>
-      </p:ext>
-    </p:extLst>
-  </p:cSld>
-  <p:clrMapOvr>
-    <a:masterClrMapping/>
-  </p:clrMapOvr>
-</p:sld>
-</file>
-
-<file path=ppt/slides/slide5.xml><?xml version="1.0" encoding="utf-8"?>
 <p:sld xmlns:a="http://schemas.openxmlformats.org/drawingml/2006/main" xmlns:r="http://schemas.openxmlformats.org/officeDocument/2006/relationships" xmlns:p="http://schemas.openxmlformats.org/presentationml/2006/main">
   <p:cSld>
     <p:spTree>
@@ -16102,7 +15746,7 @@
 </p:sld>
 </file>
 
-<file path=ppt/slides/slide6.xml><?xml version="1.0" encoding="utf-8"?>
+<file path=ppt/slides/slide5.xml><?xml version="1.0" encoding="utf-8"?>
 <p:sld xmlns:a="http://schemas.openxmlformats.org/drawingml/2006/main" xmlns:r="http://schemas.openxmlformats.org/officeDocument/2006/relationships" xmlns:p="http://schemas.openxmlformats.org/presentationml/2006/main">
   <p:cSld>
     <p:spTree>
@@ -16475,7 +16119,7 @@
 </p:sld>
 </file>
 
-<file path=ppt/slides/slide7.xml><?xml version="1.0" encoding="utf-8"?>
+<file path=ppt/slides/slide6.xml><?xml version="1.0" encoding="utf-8"?>
 <p:sld xmlns:a="http://schemas.openxmlformats.org/drawingml/2006/main" xmlns:r="http://schemas.openxmlformats.org/officeDocument/2006/relationships" xmlns:p="http://schemas.openxmlformats.org/presentationml/2006/main">
   <p:cSld>
     <p:spTree>
@@ -17197,6 +16841,369 @@
     <p:extLst>
       <p:ext uri="{BB962C8B-B14F-4D97-AF65-F5344CB8AC3E}">
         <p14:creationId xmlns:p14="http://schemas.microsoft.com/office/powerpoint/2010/main" val="1696032305"/>
+      </p:ext>
+    </p:extLst>
+  </p:cSld>
+  <p:clrMapOvr>
+    <a:masterClrMapping/>
+  </p:clrMapOvr>
+</p:sld>
+</file>
+
+<file path=ppt/slides/slide7.xml><?xml version="1.0" encoding="utf-8"?>
+<p:sld xmlns:a="http://schemas.openxmlformats.org/drawingml/2006/main" xmlns:r="http://schemas.openxmlformats.org/officeDocument/2006/relationships" xmlns:p="http://schemas.openxmlformats.org/presentationml/2006/main">
+  <p:cSld>
+    <p:spTree>
+      <p:nvGrpSpPr>
+        <p:cNvPr id="1" name=""/>
+        <p:cNvGrpSpPr/>
+        <p:nvPr/>
+      </p:nvGrpSpPr>
+      <p:grpSpPr>
+        <a:xfrm>
+          <a:off x="0" y="0"/>
+          <a:ext cx="0" cy="0"/>
+          <a:chOff x="0" y="0"/>
+          <a:chExt cx="0" cy="0"/>
+        </a:xfrm>
+      </p:grpSpPr>
+      <p:grpSp>
+        <p:nvGrpSpPr>
+          <p:cNvPr id="8" name="Google Shape;84;p1">
+            <a:extLst>
+              <a:ext uri="{FF2B5EF4-FFF2-40B4-BE49-F238E27FC236}">
+                <a16:creationId xmlns:a16="http://schemas.microsoft.com/office/drawing/2014/main" id="{B1C64784-E3AE-A466-2118-F93376B6D0FB}"/>
+              </a:ext>
+            </a:extLst>
+          </p:cNvPr>
+          <p:cNvGrpSpPr/>
+          <p:nvPr/>
+        </p:nvGrpSpPr>
+        <p:grpSpPr>
+          <a:xfrm>
+            <a:off x="0" y="-817728"/>
+            <a:ext cx="12195742" cy="2214463"/>
+            <a:chOff x="0" y="-11638"/>
+            <a:chExt cx="7315200" cy="1216152"/>
+          </a:xfrm>
+        </p:grpSpPr>
+        <p:sp>
+          <p:nvSpPr>
+            <p:cNvPr id="10" name="Google Shape;85;p1">
+              <a:extLst>
+                <a:ext uri="{FF2B5EF4-FFF2-40B4-BE49-F238E27FC236}">
+                  <a16:creationId xmlns:a16="http://schemas.microsoft.com/office/drawing/2014/main" id="{586C0C77-84A2-19C8-7E33-54F151175A5D}"/>
+                </a:ext>
+              </a:extLst>
+            </p:cNvPr>
+            <p:cNvSpPr/>
+            <p:nvPr/>
+          </p:nvSpPr>
+          <p:spPr>
+            <a:xfrm>
+              <a:off x="0" y="-1"/>
+              <a:ext cx="7315200" cy="1130373"/>
+            </a:xfrm>
+            <a:custGeom>
+              <a:avLst/>
+              <a:gdLst/>
+              <a:ahLst/>
+              <a:cxnLst/>
+              <a:rect l="l" t="t" r="r" b="b"/>
+              <a:pathLst>
+                <a:path w="7312660" h="1129665" extrusionOk="0">
+                  <a:moveTo>
+                    <a:pt x="0" y="0"/>
+                  </a:moveTo>
+                  <a:lnTo>
+                    <a:pt x="7312660" y="0"/>
+                  </a:lnTo>
+                  <a:lnTo>
+                    <a:pt x="7312660" y="1129665"/>
+                  </a:lnTo>
+                  <a:lnTo>
+                    <a:pt x="3619500" y="733425"/>
+                  </a:lnTo>
+                  <a:lnTo>
+                    <a:pt x="0" y="1091565"/>
+                  </a:lnTo>
+                  <a:lnTo>
+                    <a:pt x="0" y="0"/>
+                  </a:lnTo>
+                  <a:close/>
+                </a:path>
+              </a:pathLst>
+            </a:custGeom>
+            <a:solidFill>
+              <a:srgbClr val="2D7287"/>
+            </a:solidFill>
+            <a:ln>
+              <a:noFill/>
+            </a:ln>
+          </p:spPr>
+          <p:txBody>
+            <a:bodyPr spcFirstLastPara="1" wrap="square" lIns="91425" tIns="45700" rIns="91425" bIns="45700" anchor="ctr" anchorCtr="0">
+              <a:noAutofit/>
+            </a:bodyPr>
+            <a:lstStyle/>
+            <a:p>
+              <a:pPr marL="0" marR="0" lvl="0" indent="0" algn="l" rtl="0">
+                <a:lnSpc>
+                  <a:spcPct val="100000"/>
+                </a:lnSpc>
+                <a:spcBef>
+                  <a:spcPts val="0"/>
+                </a:spcBef>
+                <a:spcAft>
+                  <a:spcPts val="0"/>
+                </a:spcAft>
+                <a:buClr>
+                  <a:srgbClr val="000000"/>
+                </a:buClr>
+                <a:buSzPts val="1800"/>
+                <a:buFont typeface="Arial"/>
+                <a:buNone/>
+              </a:pPr>
+              <a:endParaRPr sz="1800" b="0" i="0" u="none" strike="noStrike" cap="none">
+                <a:solidFill>
+                  <a:schemeClr val="lt1"/>
+                </a:solidFill>
+                <a:latin typeface="Open Sans" panose="020B0606030504020204" pitchFamily="34" charset="0"/>
+                <a:ea typeface="Open Sans" panose="020B0606030504020204" pitchFamily="34" charset="0"/>
+                <a:cs typeface="Open Sans" panose="020B0606030504020204" pitchFamily="34" charset="0"/>
+                <a:sym typeface="Calibri"/>
+              </a:endParaRPr>
+            </a:p>
+          </p:txBody>
+        </p:sp>
+        <p:sp>
+          <p:nvSpPr>
+            <p:cNvPr id="11" name="Google Shape;86;p1">
+              <a:extLst>
+                <a:ext uri="{FF2B5EF4-FFF2-40B4-BE49-F238E27FC236}">
+                  <a16:creationId xmlns:a16="http://schemas.microsoft.com/office/drawing/2014/main" id="{45B2ADFE-3339-987E-2297-422E44A83E6E}"/>
+                </a:ext>
+              </a:extLst>
+            </p:cNvPr>
+            <p:cNvSpPr/>
+            <p:nvPr/>
+          </p:nvSpPr>
+          <p:spPr>
+            <a:xfrm>
+              <a:off x="0" y="-11638"/>
+              <a:ext cx="7315200" cy="1216152"/>
+            </a:xfrm>
+            <a:prstGeom prst="rect">
+              <a:avLst/>
+            </a:prstGeom>
+            <a:blipFill rotWithShape="1">
+              <a:blip r:embed="rId3">
+                <a:alphaModFix/>
+              </a:blip>
+              <a:stretch>
+                <a:fillRect r="-7571"/>
+              </a:stretch>
+            </a:blipFill>
+            <a:ln>
+              <a:noFill/>
+            </a:ln>
+          </p:spPr>
+          <p:txBody>
+            <a:bodyPr spcFirstLastPara="1" wrap="square" lIns="91425" tIns="45700" rIns="91425" bIns="45700" anchor="ctr" anchorCtr="0">
+              <a:noAutofit/>
+            </a:bodyPr>
+            <a:lstStyle/>
+            <a:p>
+              <a:pPr marL="0" marR="0" lvl="0" indent="0" algn="l" rtl="0">
+                <a:lnSpc>
+                  <a:spcPct val="100000"/>
+                </a:lnSpc>
+                <a:spcBef>
+                  <a:spcPts val="0"/>
+                </a:spcBef>
+                <a:spcAft>
+                  <a:spcPts val="0"/>
+                </a:spcAft>
+                <a:buClr>
+                  <a:srgbClr val="000000"/>
+                </a:buClr>
+                <a:buSzPts val="1800"/>
+                <a:buFont typeface="Arial"/>
+                <a:buNone/>
+              </a:pPr>
+              <a:endParaRPr sz="1800" b="0" i="0" u="none" strike="noStrike" cap="none">
+                <a:solidFill>
+                  <a:schemeClr val="lt1"/>
+                </a:solidFill>
+                <a:latin typeface="Open Sans" panose="020B0606030504020204" pitchFamily="34" charset="0"/>
+                <a:ea typeface="Open Sans" panose="020B0606030504020204" pitchFamily="34" charset="0"/>
+                <a:cs typeface="Open Sans" panose="020B0606030504020204" pitchFamily="34" charset="0"/>
+                <a:sym typeface="Calibri"/>
+              </a:endParaRPr>
+            </a:p>
+          </p:txBody>
+        </p:sp>
+      </p:grpSp>
+      <p:sp>
+        <p:nvSpPr>
+          <p:cNvPr id="13" name="ZoneTexte 12">
+            <a:extLst>
+              <a:ext uri="{FF2B5EF4-FFF2-40B4-BE49-F238E27FC236}">
+                <a16:creationId xmlns:a16="http://schemas.microsoft.com/office/drawing/2014/main" id="{F0D2CC9A-5ABC-4149-B06D-5FE38628CBDC}"/>
+              </a:ext>
+            </a:extLst>
+          </p:cNvPr>
+          <p:cNvSpPr txBox="1"/>
+          <p:nvPr/>
+        </p:nvSpPr>
+        <p:spPr>
+          <a:xfrm>
+            <a:off x="290457" y="698147"/>
+            <a:ext cx="11056994" cy="584775"/>
+          </a:xfrm>
+          <a:prstGeom prst="rect">
+            <a:avLst/>
+          </a:prstGeom>
+          <a:noFill/>
+        </p:spPr>
+        <p:txBody>
+          <a:bodyPr wrap="square">
+            <a:spAutoFit/>
+          </a:bodyPr>
+          <a:lstStyle/>
+          <a:p>
+            <a:pPr algn="ctr"/>
+            <a:r>
+              <a:rPr kumimoji="0" lang="fr-FR" sz="3200" b="1" i="0" u="none" strike="noStrike" kern="0" cap="none" spc="0" normalizeH="0" baseline="0" noProof="0" dirty="0">
+                <a:ln>
+                  <a:noFill/>
+                </a:ln>
+                <a:solidFill>
+                  <a:schemeClr val="tx1"/>
+                </a:solidFill>
+                <a:effectLst/>
+                <a:uLnTx/>
+                <a:uFillTx/>
+                <a:latin typeface="Open Sans" panose="020B0606030504020204" pitchFamily="34" charset="0"/>
+                <a:ea typeface="Open Sans" panose="020B0606030504020204" pitchFamily="34" charset="0"/>
+                <a:cs typeface="Open Sans" panose="020B0606030504020204" pitchFamily="34" charset="0"/>
+                <a:sym typeface="Open Sans"/>
+              </a:rPr>
+              <a:t>RISQUES IDENTIFIÉS</a:t>
+            </a:r>
+            <a:endParaRPr lang="fr-FR" dirty="0">
+              <a:solidFill>
+                <a:schemeClr val="tx1"/>
+              </a:solidFill>
+            </a:endParaRPr>
+          </a:p>
+        </p:txBody>
+      </p:sp>
+      <p:pic>
+        <p:nvPicPr>
+          <p:cNvPr id="6" name="Image 5">
+            <a:extLst>
+              <a:ext uri="{FF2B5EF4-FFF2-40B4-BE49-F238E27FC236}">
+                <a16:creationId xmlns:a16="http://schemas.microsoft.com/office/drawing/2014/main" id="{37F3FD66-3A51-F225-FDE2-DBD76A35D1D3}"/>
+              </a:ext>
+            </a:extLst>
+          </p:cNvPr>
+          <p:cNvPicPr>
+            <a:picLocks noChangeAspect="1"/>
+          </p:cNvPicPr>
+          <p:nvPr/>
+        </p:nvPicPr>
+        <p:blipFill>
+          <a:blip r:embed="rId4"/>
+          <a:stretch>
+            <a:fillRect/>
+          </a:stretch>
+        </p:blipFill>
+        <p:spPr>
+          <a:xfrm>
+            <a:off x="101380" y="1282922"/>
+            <a:ext cx="5610931" cy="5245568"/>
+          </a:xfrm>
+          <a:prstGeom prst="rect">
+            <a:avLst/>
+          </a:prstGeom>
+        </p:spPr>
+      </p:pic>
+      <p:pic>
+        <p:nvPicPr>
+          <p:cNvPr id="9" name="Image 8">
+            <a:extLst>
+              <a:ext uri="{FF2B5EF4-FFF2-40B4-BE49-F238E27FC236}">
+                <a16:creationId xmlns:a16="http://schemas.microsoft.com/office/drawing/2014/main" id="{102ECF47-96B9-E945-5D8A-D4364898DE94}"/>
+              </a:ext>
+            </a:extLst>
+          </p:cNvPr>
+          <p:cNvPicPr>
+            <a:picLocks noChangeAspect="1"/>
+          </p:cNvPicPr>
+          <p:nvPr/>
+        </p:nvPicPr>
+        <p:blipFill>
+          <a:blip r:embed="rId5"/>
+          <a:stretch>
+            <a:fillRect/>
+          </a:stretch>
+        </p:blipFill>
+        <p:spPr>
+          <a:xfrm>
+            <a:off x="5818954" y="1324654"/>
+            <a:ext cx="6373046" cy="5319507"/>
+          </a:xfrm>
+          <a:prstGeom prst="rect">
+            <a:avLst/>
+          </a:prstGeom>
+        </p:spPr>
+      </p:pic>
+      <p:pic>
+        <p:nvPicPr>
+          <p:cNvPr id="15" name="Image 14">
+            <a:extLst>
+              <a:ext uri="{FF2B5EF4-FFF2-40B4-BE49-F238E27FC236}">
+                <a16:creationId xmlns:a16="http://schemas.microsoft.com/office/drawing/2014/main" id="{CD1169C9-2E70-0C8B-D7F5-102755A884A5}"/>
+              </a:ext>
+            </a:extLst>
+          </p:cNvPr>
+          <p:cNvPicPr>
+            <a:picLocks noChangeAspect="1"/>
+          </p:cNvPicPr>
+          <p:nvPr/>
+        </p:nvPicPr>
+        <p:blipFill>
+          <a:blip r:embed="rId6">
+            <a:extLst>
+              <a:ext uri="{28A0092B-C50C-407E-A947-70E740481C1C}">
+                <a14:useLocalDpi xmlns:a14="http://schemas.microsoft.com/office/drawing/2010/main" val="0"/>
+              </a:ext>
+            </a:extLst>
+          </a:blip>
+          <a:srcRect/>
+          <a:stretch>
+            <a:fillRect/>
+          </a:stretch>
+        </p:blipFill>
+        <p:spPr bwMode="auto">
+          <a:xfrm>
+            <a:off x="139850" y="5902292"/>
+            <a:ext cx="869322" cy="869322"/>
+          </a:xfrm>
+          <a:prstGeom prst="rect">
+            <a:avLst/>
+          </a:prstGeom>
+          <a:noFill/>
+          <a:ln>
+            <a:noFill/>
+          </a:ln>
+        </p:spPr>
+      </p:pic>
+    </p:spTree>
+    <p:extLst>
+      <p:ext uri="{BB962C8B-B14F-4D97-AF65-F5344CB8AC3E}">
+        <p14:creationId xmlns:p14="http://schemas.microsoft.com/office/powerpoint/2010/main" val="1502992412"/>
       </p:ext>
     </p:extLst>
   </p:cSld>

</xml_diff>